<commit_message>
Update of AIAA conference paper
Write-up of conference paper
Intro and Method written (1st draft)
Results analyzed in spreadsheets, not written up.
</commit_message>
<xml_diff>
--- a/WindRoses/1000-run-experiments/figs/3x1000-run-6-best.pptx
+++ b/WindRoses/1000-run-experiments/figs/3x1000-run-6-best.pptx
@@ -5,10 +5,12 @@
     <p:sldMasterId id="2147483648" r:id="rId1"/>
   </p:sldMasterIdLst>
   <p:notesMasterIdLst>
-    <p:notesMasterId r:id="rId3"/>
+    <p:notesMasterId r:id="rId5"/>
   </p:notesMasterIdLst>
   <p:sldIdLst>
     <p:sldId id="266" r:id="rId2"/>
+    <p:sldId id="267" r:id="rId3"/>
+    <p:sldId id="268" r:id="rId4"/>
   </p:sldIdLst>
   <p:sldSz cx="12192000" cy="6858000"/>
   <p:notesSz cx="6858000" cy="9144000"/>
@@ -197,7 +199,7 @@
           <a:p>
             <a:fld id="{E14872B6-F689-E44A-8E3C-82DC0EDFF058}" type="datetimeFigureOut">
               <a:rPr lang="en-US" smtClean="0"/>
-              <a:t>7/16/18</a:t>
+              <a:t>11/12/18</a:t>
             </a:fld>
             <a:endParaRPr lang="en-US"/>
           </a:p>
@@ -680,7 +682,7 @@
           <a:p>
             <a:fld id="{60E14EAC-D818-B040-8A46-2C435BD89EE4}" type="datetimeFigureOut">
               <a:rPr lang="en-US" smtClean="0"/>
-              <a:t>7/16/18</a:t>
+              <a:t>11/12/18</a:t>
             </a:fld>
             <a:endParaRPr lang="en-US"/>
           </a:p>
@@ -850,7 +852,7 @@
           <a:p>
             <a:fld id="{60E14EAC-D818-B040-8A46-2C435BD89EE4}" type="datetimeFigureOut">
               <a:rPr lang="en-US" smtClean="0"/>
-              <a:t>7/16/18</a:t>
+              <a:t>11/12/18</a:t>
             </a:fld>
             <a:endParaRPr lang="en-US"/>
           </a:p>
@@ -1030,7 +1032,7 @@
           <a:p>
             <a:fld id="{60E14EAC-D818-B040-8A46-2C435BD89EE4}" type="datetimeFigureOut">
               <a:rPr lang="en-US" smtClean="0"/>
-              <a:t>7/16/18</a:t>
+              <a:t>11/12/18</a:t>
             </a:fld>
             <a:endParaRPr lang="en-US"/>
           </a:p>
@@ -1200,7 +1202,7 @@
           <a:p>
             <a:fld id="{60E14EAC-D818-B040-8A46-2C435BD89EE4}" type="datetimeFigureOut">
               <a:rPr lang="en-US" smtClean="0"/>
-              <a:t>7/16/18</a:t>
+              <a:t>11/12/18</a:t>
             </a:fld>
             <a:endParaRPr lang="en-US"/>
           </a:p>
@@ -1446,7 +1448,7 @@
           <a:p>
             <a:fld id="{60E14EAC-D818-B040-8A46-2C435BD89EE4}" type="datetimeFigureOut">
               <a:rPr lang="en-US" smtClean="0"/>
-              <a:t>7/16/18</a:t>
+              <a:t>11/12/18</a:t>
             </a:fld>
             <a:endParaRPr lang="en-US"/>
           </a:p>
@@ -1678,7 +1680,7 @@
           <a:p>
             <a:fld id="{60E14EAC-D818-B040-8A46-2C435BD89EE4}" type="datetimeFigureOut">
               <a:rPr lang="en-US" smtClean="0"/>
-              <a:t>7/16/18</a:t>
+              <a:t>11/12/18</a:t>
             </a:fld>
             <a:endParaRPr lang="en-US"/>
           </a:p>
@@ -2045,7 +2047,7 @@
           <a:p>
             <a:fld id="{60E14EAC-D818-B040-8A46-2C435BD89EE4}" type="datetimeFigureOut">
               <a:rPr lang="en-US" smtClean="0"/>
-              <a:t>7/16/18</a:t>
+              <a:t>11/12/18</a:t>
             </a:fld>
             <a:endParaRPr lang="en-US"/>
           </a:p>
@@ -2163,7 +2165,7 @@
           <a:p>
             <a:fld id="{60E14EAC-D818-B040-8A46-2C435BD89EE4}" type="datetimeFigureOut">
               <a:rPr lang="en-US" smtClean="0"/>
-              <a:t>7/16/18</a:t>
+              <a:t>11/12/18</a:t>
             </a:fld>
             <a:endParaRPr lang="en-US"/>
           </a:p>
@@ -2258,7 +2260,7 @@
           <a:p>
             <a:fld id="{60E14EAC-D818-B040-8A46-2C435BD89EE4}" type="datetimeFigureOut">
               <a:rPr lang="en-US" smtClean="0"/>
-              <a:t>7/16/18</a:t>
+              <a:t>11/12/18</a:t>
             </a:fld>
             <a:endParaRPr lang="en-US"/>
           </a:p>
@@ -2535,7 +2537,7 @@
           <a:p>
             <a:fld id="{60E14EAC-D818-B040-8A46-2C435BD89EE4}" type="datetimeFigureOut">
               <a:rPr lang="en-US" smtClean="0"/>
-              <a:t>7/16/18</a:t>
+              <a:t>11/12/18</a:t>
             </a:fld>
             <a:endParaRPr lang="en-US"/>
           </a:p>
@@ -2788,7 +2790,7 @@
           <a:p>
             <a:fld id="{60E14EAC-D818-B040-8A46-2C435BD89EE4}" type="datetimeFigureOut">
               <a:rPr lang="en-US" smtClean="0"/>
-              <a:t>7/16/18</a:t>
+              <a:t>11/12/18</a:t>
             </a:fld>
             <a:endParaRPr lang="en-US"/>
           </a:p>
@@ -3001,7 +3003,7 @@
           <a:p>
             <a:fld id="{60E14EAC-D818-B040-8A46-2C435BD89EE4}" type="datetimeFigureOut">
               <a:rPr lang="en-US" smtClean="0"/>
-              <a:t>7/16/18</a:t>
+              <a:t>11/12/18</a:t>
             </a:fld>
             <a:endParaRPr lang="en-US"/>
           </a:p>
@@ -4261,6 +4263,246 @@
       </p:par>
     </p:tnLst>
   </p:timing>
+</p:sld>
+</file>
+
+<file path=ppt/slides/slide2.xml><?xml version="1.0" encoding="utf-8"?>
+<p:sld xmlns:a="http://schemas.openxmlformats.org/drawingml/2006/main" xmlns:r="http://schemas.openxmlformats.org/officeDocument/2006/relationships" xmlns:p="http://schemas.openxmlformats.org/presentationml/2006/main">
+  <p:cSld>
+    <p:spTree>
+      <p:nvGrpSpPr>
+        <p:cNvPr id="1" name=""/>
+        <p:cNvGrpSpPr/>
+        <p:nvPr/>
+      </p:nvGrpSpPr>
+      <p:grpSpPr>
+        <a:xfrm>
+          <a:off x="0" y="0"/>
+          <a:ext cx="0" cy="0"/>
+          <a:chOff x="0" y="0"/>
+          <a:chExt cx="0" cy="0"/>
+        </a:xfrm>
+      </p:grpSpPr>
+      <p:pic>
+        <p:nvPicPr>
+          <p:cNvPr id="4" name="Picture 3"/>
+          <p:cNvPicPr>
+            <a:picLocks noChangeAspect="1"/>
+          </p:cNvPicPr>
+          <p:nvPr/>
+        </p:nvPicPr>
+        <p:blipFill>
+          <a:blip r:embed="rId2">
+            <a:extLst>
+              <a:ext uri="{28A0092B-C50C-407E-A947-70E740481C1C}">
+                <a14:useLocalDpi xmlns:a14="http://schemas.microsoft.com/office/drawing/2010/main" val="0"/>
+              </a:ext>
+            </a:extLst>
+          </a:blip>
+          <a:stretch>
+            <a:fillRect/>
+          </a:stretch>
+        </p:blipFill>
+        <p:spPr>
+          <a:xfrm>
+            <a:off x="7639734" y="1652782"/>
+            <a:ext cx="4933861" cy="3703070"/>
+          </a:xfrm>
+          <a:prstGeom prst="rect">
+            <a:avLst/>
+          </a:prstGeom>
+        </p:spPr>
+      </p:pic>
+      <p:pic>
+        <p:nvPicPr>
+          <p:cNvPr id="5" name="Picture 4"/>
+          <p:cNvPicPr>
+            <a:picLocks noChangeAspect="1"/>
+          </p:cNvPicPr>
+          <p:nvPr/>
+        </p:nvPicPr>
+        <p:blipFill>
+          <a:blip r:embed="rId3">
+            <a:extLst>
+              <a:ext uri="{28A0092B-C50C-407E-A947-70E740481C1C}">
+                <a14:useLocalDpi xmlns:a14="http://schemas.microsoft.com/office/drawing/2010/main" val="0"/>
+              </a:ext>
+            </a:extLst>
+          </a:blip>
+          <a:stretch>
+            <a:fillRect/>
+          </a:stretch>
+        </p:blipFill>
+        <p:spPr>
+          <a:xfrm>
+            <a:off x="4012424" y="1654500"/>
+            <a:ext cx="4928758" cy="3699240"/>
+          </a:xfrm>
+          <a:prstGeom prst="rect">
+            <a:avLst/>
+          </a:prstGeom>
+        </p:spPr>
+      </p:pic>
+      <p:pic>
+        <p:nvPicPr>
+          <p:cNvPr id="6" name="Picture 5"/>
+          <p:cNvPicPr>
+            <a:picLocks noChangeAspect="1"/>
+          </p:cNvPicPr>
+          <p:nvPr/>
+        </p:nvPicPr>
+        <p:blipFill>
+          <a:blip r:embed="rId4">
+            <a:extLst>
+              <a:ext uri="{28A0092B-C50C-407E-A947-70E740481C1C}">
+                <a14:useLocalDpi xmlns:a14="http://schemas.microsoft.com/office/drawing/2010/main" val="0"/>
+              </a:ext>
+            </a:extLst>
+          </a:blip>
+          <a:stretch>
+            <a:fillRect/>
+          </a:stretch>
+        </p:blipFill>
+        <p:spPr>
+          <a:xfrm>
+            <a:off x="380011" y="1653641"/>
+            <a:ext cx="4931048" cy="3700958"/>
+          </a:xfrm>
+          <a:prstGeom prst="rect">
+            <a:avLst/>
+          </a:prstGeom>
+        </p:spPr>
+      </p:pic>
+    </p:spTree>
+    <p:extLst>
+      <p:ext uri="{BB962C8B-B14F-4D97-AF65-F5344CB8AC3E}">
+        <p14:creationId xmlns:p14="http://schemas.microsoft.com/office/powerpoint/2010/main" val="209211535"/>
+      </p:ext>
+    </p:extLst>
+  </p:cSld>
+  <p:clrMapOvr>
+    <a:masterClrMapping/>
+  </p:clrMapOvr>
+</p:sld>
+</file>
+
+<file path=ppt/slides/slide3.xml><?xml version="1.0" encoding="utf-8"?>
+<p:sld xmlns:a="http://schemas.openxmlformats.org/drawingml/2006/main" xmlns:r="http://schemas.openxmlformats.org/officeDocument/2006/relationships" xmlns:p="http://schemas.openxmlformats.org/presentationml/2006/main">
+  <p:cSld>
+    <p:spTree>
+      <p:nvGrpSpPr>
+        <p:cNvPr id="1" name=""/>
+        <p:cNvGrpSpPr/>
+        <p:nvPr/>
+      </p:nvGrpSpPr>
+      <p:grpSpPr>
+        <a:xfrm>
+          <a:off x="0" y="0"/>
+          <a:ext cx="0" cy="0"/>
+          <a:chOff x="0" y="0"/>
+          <a:chExt cx="0" cy="0"/>
+        </a:xfrm>
+      </p:grpSpPr>
+      <p:pic>
+        <p:nvPicPr>
+          <p:cNvPr id="4" name="Picture 3"/>
+          <p:cNvPicPr>
+            <a:picLocks noChangeAspect="1"/>
+          </p:cNvPicPr>
+          <p:nvPr/>
+        </p:nvPicPr>
+        <p:blipFill>
+          <a:blip r:embed="rId2">
+            <a:extLst>
+              <a:ext uri="{28A0092B-C50C-407E-A947-70E740481C1C}">
+                <a14:useLocalDpi xmlns:a14="http://schemas.microsoft.com/office/drawing/2010/main" val="0"/>
+              </a:ext>
+            </a:extLst>
+          </a:blip>
+          <a:stretch>
+            <a:fillRect/>
+          </a:stretch>
+        </p:blipFill>
+        <p:spPr>
+          <a:xfrm>
+            <a:off x="371973" y="1708332"/>
+            <a:ext cx="4175966" cy="3134239"/>
+          </a:xfrm>
+          <a:prstGeom prst="rect">
+            <a:avLst/>
+          </a:prstGeom>
+        </p:spPr>
+      </p:pic>
+      <p:pic>
+        <p:nvPicPr>
+          <p:cNvPr id="5" name="Picture 4"/>
+          <p:cNvPicPr>
+            <a:picLocks noChangeAspect="1"/>
+          </p:cNvPicPr>
+          <p:nvPr/>
+        </p:nvPicPr>
+        <p:blipFill>
+          <a:blip r:embed="rId3">
+            <a:extLst>
+              <a:ext uri="{28A0092B-C50C-407E-A947-70E740481C1C}">
+                <a14:useLocalDpi xmlns:a14="http://schemas.microsoft.com/office/drawing/2010/main" val="0"/>
+              </a:ext>
+            </a:extLst>
+          </a:blip>
+          <a:stretch>
+            <a:fillRect/>
+          </a:stretch>
+        </p:blipFill>
+        <p:spPr>
+          <a:xfrm>
+            <a:off x="4194005" y="1708332"/>
+            <a:ext cx="4175963" cy="3134238"/>
+          </a:xfrm>
+          <a:prstGeom prst="rect">
+            <a:avLst/>
+          </a:prstGeom>
+        </p:spPr>
+      </p:pic>
+      <p:pic>
+        <p:nvPicPr>
+          <p:cNvPr id="6" name="Picture 5"/>
+          <p:cNvPicPr>
+            <a:picLocks noChangeAspect="1"/>
+          </p:cNvPicPr>
+          <p:nvPr/>
+        </p:nvPicPr>
+        <p:blipFill>
+          <a:blip r:embed="rId4">
+            <a:extLst>
+              <a:ext uri="{28A0092B-C50C-407E-A947-70E740481C1C}">
+                <a14:useLocalDpi xmlns:a14="http://schemas.microsoft.com/office/drawing/2010/main" val="0"/>
+              </a:ext>
+            </a:extLst>
+          </a:blip>
+          <a:stretch>
+            <a:fillRect/>
+          </a:stretch>
+        </p:blipFill>
+        <p:spPr>
+          <a:xfrm>
+            <a:off x="8016035" y="1708332"/>
+            <a:ext cx="4175965" cy="3134239"/>
+          </a:xfrm>
+          <a:prstGeom prst="rect">
+            <a:avLst/>
+          </a:prstGeom>
+        </p:spPr>
+      </p:pic>
+    </p:spTree>
+    <p:extLst>
+      <p:ext uri="{BB962C8B-B14F-4D97-AF65-F5344CB8AC3E}">
+        <p14:creationId xmlns:p14="http://schemas.microsoft.com/office/powerpoint/2010/main" val="660012874"/>
+      </p:ext>
+    </p:extLst>
+  </p:cSld>
+  <p:clrMapOvr>
+    <a:masterClrMapping/>
+  </p:clrMapOvr>
 </p:sld>
 </file>
 

</xml_diff>